<commit_message>
Added more JS slides
</commit_message>
<xml_diff>
--- a/presentation_slides/JavaSript.pptx
+++ b/presentation_slides/JavaSript.pptx
@@ -5,7 +5,7 @@
     <p:sldMasterId id="2147483648" r:id="rId4"/>
   </p:sldMasterIdLst>
   <p:notesMasterIdLst>
-    <p:notesMasterId r:id="rId12"/>
+    <p:notesMasterId r:id="rId16"/>
   </p:notesMasterIdLst>
   <p:sldIdLst>
     <p:sldId id="288" r:id="rId5"/>
@@ -15,6 +15,10 @@
     <p:sldId id="291" r:id="rId9"/>
     <p:sldId id="292" r:id="rId10"/>
     <p:sldId id="293" r:id="rId11"/>
+    <p:sldId id="294" r:id="rId12"/>
+    <p:sldId id="295" r:id="rId13"/>
+    <p:sldId id="296" r:id="rId14"/>
+    <p:sldId id="297" r:id="rId15"/>
   </p:sldIdLst>
   <p:sldSz cx="12192000" cy="6858000"/>
   <p:notesSz cx="6858000" cy="2019300"/>
@@ -640,6 +644,90 @@
 </p:notes>
 </file>
 
+<file path=ppt/notesSlides/notesSlide10.xml><?xml version="1.0" encoding="utf-8"?>
+<p:notes xmlns:a="http://schemas.openxmlformats.org/drawingml/2006/main" xmlns:r="http://schemas.openxmlformats.org/officeDocument/2006/relationships" xmlns:p="http://schemas.openxmlformats.org/presentationml/2006/main">
+  <p:cSld>
+    <p:spTree>
+      <p:nvGrpSpPr>
+        <p:cNvPr id="1" name=""/>
+        <p:cNvGrpSpPr/>
+        <p:nvPr/>
+      </p:nvGrpSpPr>
+      <p:grpSpPr>
+        <a:xfrm>
+          <a:off x="0" y="0"/>
+          <a:ext cx="0" cy="0"/>
+          <a:chOff x="0" y="0"/>
+          <a:chExt cx="0" cy="0"/>
+        </a:xfrm>
+      </p:grpSpPr>
+      <p:sp>
+        <p:nvSpPr>
+          <p:cNvPr id="2" name="Slide Image Placeholder 1"/>
+          <p:cNvSpPr>
+            <a:spLocks noGrp="1" noRot="1" noChangeAspect="1"/>
+          </p:cNvSpPr>
+          <p:nvPr>
+            <p:ph type="sldImg"/>
+          </p:nvPr>
+        </p:nvSpPr>
+        <p:spPr/>
+      </p:sp>
+      <p:sp>
+        <p:nvSpPr>
+          <p:cNvPr id="3" name="Notes Placeholder 2"/>
+          <p:cNvSpPr>
+            <a:spLocks noGrp="1"/>
+          </p:cNvSpPr>
+          <p:nvPr>
+            <p:ph type="body" idx="1"/>
+          </p:nvPr>
+        </p:nvSpPr>
+        <p:spPr/>
+        <p:txBody>
+          <a:bodyPr/>
+          <a:lstStyle/>
+          <a:p>
+            <a:endParaRPr lang="en-NZ" dirty="0"/>
+          </a:p>
+        </p:txBody>
+      </p:sp>
+      <p:sp>
+        <p:nvSpPr>
+          <p:cNvPr id="4" name="Slide Number Placeholder 3"/>
+          <p:cNvSpPr>
+            <a:spLocks noGrp="1"/>
+          </p:cNvSpPr>
+          <p:nvPr>
+            <p:ph type="sldNum" sz="quarter" idx="5"/>
+          </p:nvPr>
+        </p:nvSpPr>
+        <p:spPr/>
+        <p:txBody>
+          <a:bodyPr/>
+          <a:lstStyle/>
+          <a:p>
+            <a:fld id="{A008DDF4-253B-4E36-BE28-46B8E6426B7B}" type="slidenum">
+              <a:rPr lang="en-US" smtClean="0"/>
+              <a:t>11</a:t>
+            </a:fld>
+            <a:endParaRPr lang="en-US"/>
+          </a:p>
+        </p:txBody>
+      </p:sp>
+    </p:spTree>
+    <p:extLst>
+      <p:ext uri="{BB962C8B-B14F-4D97-AF65-F5344CB8AC3E}">
+        <p14:creationId xmlns:p14="http://schemas.microsoft.com/office/powerpoint/2010/main" val="1556381432"/>
+      </p:ext>
+    </p:extLst>
+  </p:cSld>
+  <p:clrMapOvr>
+    <a:masterClrMapping/>
+  </p:clrMapOvr>
+</p:notes>
+</file>
+
 <file path=ppt/notesSlides/notesSlide2.xml><?xml version="1.0" encoding="utf-8"?>
 <p:notes xmlns:a="http://schemas.openxmlformats.org/drawingml/2006/main" xmlns:r="http://schemas.openxmlformats.org/officeDocument/2006/relationships" xmlns:p="http://schemas.openxmlformats.org/presentationml/2006/main">
   <p:cSld>
@@ -1051,6 +1139,258 @@
     <p:extLst>
       <p:ext uri="{BB962C8B-B14F-4D97-AF65-F5344CB8AC3E}">
         <p14:creationId xmlns:p14="http://schemas.microsoft.com/office/powerpoint/2010/main" val="3011258537"/>
+      </p:ext>
+    </p:extLst>
+  </p:cSld>
+  <p:clrMapOvr>
+    <a:masterClrMapping/>
+  </p:clrMapOvr>
+</p:notes>
+</file>
+
+<file path=ppt/notesSlides/notesSlide7.xml><?xml version="1.0" encoding="utf-8"?>
+<p:notes xmlns:a="http://schemas.openxmlformats.org/drawingml/2006/main" xmlns:r="http://schemas.openxmlformats.org/officeDocument/2006/relationships" xmlns:p="http://schemas.openxmlformats.org/presentationml/2006/main">
+  <p:cSld>
+    <p:spTree>
+      <p:nvGrpSpPr>
+        <p:cNvPr id="1" name=""/>
+        <p:cNvGrpSpPr/>
+        <p:nvPr/>
+      </p:nvGrpSpPr>
+      <p:grpSpPr>
+        <a:xfrm>
+          <a:off x="0" y="0"/>
+          <a:ext cx="0" cy="0"/>
+          <a:chOff x="0" y="0"/>
+          <a:chExt cx="0" cy="0"/>
+        </a:xfrm>
+      </p:grpSpPr>
+      <p:sp>
+        <p:nvSpPr>
+          <p:cNvPr id="2" name="Slide Image Placeholder 1"/>
+          <p:cNvSpPr>
+            <a:spLocks noGrp="1" noRot="1" noChangeAspect="1"/>
+          </p:cNvSpPr>
+          <p:nvPr>
+            <p:ph type="sldImg"/>
+          </p:nvPr>
+        </p:nvSpPr>
+        <p:spPr/>
+      </p:sp>
+      <p:sp>
+        <p:nvSpPr>
+          <p:cNvPr id="3" name="Notes Placeholder 2"/>
+          <p:cNvSpPr>
+            <a:spLocks noGrp="1"/>
+          </p:cNvSpPr>
+          <p:nvPr>
+            <p:ph type="body" idx="1"/>
+          </p:nvPr>
+        </p:nvSpPr>
+        <p:spPr/>
+        <p:txBody>
+          <a:bodyPr/>
+          <a:lstStyle/>
+          <a:p>
+            <a:endParaRPr lang="en-NZ" dirty="0"/>
+          </a:p>
+        </p:txBody>
+      </p:sp>
+      <p:sp>
+        <p:nvSpPr>
+          <p:cNvPr id="4" name="Slide Number Placeholder 3"/>
+          <p:cNvSpPr>
+            <a:spLocks noGrp="1"/>
+          </p:cNvSpPr>
+          <p:nvPr>
+            <p:ph type="sldNum" sz="quarter" idx="5"/>
+          </p:nvPr>
+        </p:nvSpPr>
+        <p:spPr/>
+        <p:txBody>
+          <a:bodyPr/>
+          <a:lstStyle/>
+          <a:p>
+            <a:fld id="{A008DDF4-253B-4E36-BE28-46B8E6426B7B}" type="slidenum">
+              <a:rPr lang="en-US" smtClean="0"/>
+              <a:t>8</a:t>
+            </a:fld>
+            <a:endParaRPr lang="en-US"/>
+          </a:p>
+        </p:txBody>
+      </p:sp>
+    </p:spTree>
+    <p:extLst>
+      <p:ext uri="{BB962C8B-B14F-4D97-AF65-F5344CB8AC3E}">
+        <p14:creationId xmlns:p14="http://schemas.microsoft.com/office/powerpoint/2010/main" val="3789530529"/>
+      </p:ext>
+    </p:extLst>
+  </p:cSld>
+  <p:clrMapOvr>
+    <a:masterClrMapping/>
+  </p:clrMapOvr>
+</p:notes>
+</file>
+
+<file path=ppt/notesSlides/notesSlide8.xml><?xml version="1.0" encoding="utf-8"?>
+<p:notes xmlns:a="http://schemas.openxmlformats.org/drawingml/2006/main" xmlns:r="http://schemas.openxmlformats.org/officeDocument/2006/relationships" xmlns:p="http://schemas.openxmlformats.org/presentationml/2006/main">
+  <p:cSld>
+    <p:spTree>
+      <p:nvGrpSpPr>
+        <p:cNvPr id="1" name=""/>
+        <p:cNvGrpSpPr/>
+        <p:nvPr/>
+      </p:nvGrpSpPr>
+      <p:grpSpPr>
+        <a:xfrm>
+          <a:off x="0" y="0"/>
+          <a:ext cx="0" cy="0"/>
+          <a:chOff x="0" y="0"/>
+          <a:chExt cx="0" cy="0"/>
+        </a:xfrm>
+      </p:grpSpPr>
+      <p:sp>
+        <p:nvSpPr>
+          <p:cNvPr id="2" name="Slide Image Placeholder 1"/>
+          <p:cNvSpPr>
+            <a:spLocks noGrp="1" noRot="1" noChangeAspect="1"/>
+          </p:cNvSpPr>
+          <p:nvPr>
+            <p:ph type="sldImg"/>
+          </p:nvPr>
+        </p:nvSpPr>
+        <p:spPr/>
+      </p:sp>
+      <p:sp>
+        <p:nvSpPr>
+          <p:cNvPr id="3" name="Notes Placeholder 2"/>
+          <p:cNvSpPr>
+            <a:spLocks noGrp="1"/>
+          </p:cNvSpPr>
+          <p:nvPr>
+            <p:ph type="body" idx="1"/>
+          </p:nvPr>
+        </p:nvSpPr>
+        <p:spPr/>
+        <p:txBody>
+          <a:bodyPr/>
+          <a:lstStyle/>
+          <a:p>
+            <a:endParaRPr lang="en-NZ" dirty="0"/>
+          </a:p>
+        </p:txBody>
+      </p:sp>
+      <p:sp>
+        <p:nvSpPr>
+          <p:cNvPr id="4" name="Slide Number Placeholder 3"/>
+          <p:cNvSpPr>
+            <a:spLocks noGrp="1"/>
+          </p:cNvSpPr>
+          <p:nvPr>
+            <p:ph type="sldNum" sz="quarter" idx="5"/>
+          </p:nvPr>
+        </p:nvSpPr>
+        <p:spPr/>
+        <p:txBody>
+          <a:bodyPr/>
+          <a:lstStyle/>
+          <a:p>
+            <a:fld id="{A008DDF4-253B-4E36-BE28-46B8E6426B7B}" type="slidenum">
+              <a:rPr lang="en-US" smtClean="0"/>
+              <a:t>9</a:t>
+            </a:fld>
+            <a:endParaRPr lang="en-US"/>
+          </a:p>
+        </p:txBody>
+      </p:sp>
+    </p:spTree>
+    <p:extLst>
+      <p:ext uri="{BB962C8B-B14F-4D97-AF65-F5344CB8AC3E}">
+        <p14:creationId xmlns:p14="http://schemas.microsoft.com/office/powerpoint/2010/main" val="512551218"/>
+      </p:ext>
+    </p:extLst>
+  </p:cSld>
+  <p:clrMapOvr>
+    <a:masterClrMapping/>
+  </p:clrMapOvr>
+</p:notes>
+</file>
+
+<file path=ppt/notesSlides/notesSlide9.xml><?xml version="1.0" encoding="utf-8"?>
+<p:notes xmlns:a="http://schemas.openxmlformats.org/drawingml/2006/main" xmlns:r="http://schemas.openxmlformats.org/officeDocument/2006/relationships" xmlns:p="http://schemas.openxmlformats.org/presentationml/2006/main">
+  <p:cSld>
+    <p:spTree>
+      <p:nvGrpSpPr>
+        <p:cNvPr id="1" name=""/>
+        <p:cNvGrpSpPr/>
+        <p:nvPr/>
+      </p:nvGrpSpPr>
+      <p:grpSpPr>
+        <a:xfrm>
+          <a:off x="0" y="0"/>
+          <a:ext cx="0" cy="0"/>
+          <a:chOff x="0" y="0"/>
+          <a:chExt cx="0" cy="0"/>
+        </a:xfrm>
+      </p:grpSpPr>
+      <p:sp>
+        <p:nvSpPr>
+          <p:cNvPr id="2" name="Slide Image Placeholder 1"/>
+          <p:cNvSpPr>
+            <a:spLocks noGrp="1" noRot="1" noChangeAspect="1"/>
+          </p:cNvSpPr>
+          <p:nvPr>
+            <p:ph type="sldImg"/>
+          </p:nvPr>
+        </p:nvSpPr>
+        <p:spPr/>
+      </p:sp>
+      <p:sp>
+        <p:nvSpPr>
+          <p:cNvPr id="3" name="Notes Placeholder 2"/>
+          <p:cNvSpPr>
+            <a:spLocks noGrp="1"/>
+          </p:cNvSpPr>
+          <p:nvPr>
+            <p:ph type="body" idx="1"/>
+          </p:nvPr>
+        </p:nvSpPr>
+        <p:spPr/>
+        <p:txBody>
+          <a:bodyPr/>
+          <a:lstStyle/>
+          <a:p>
+            <a:endParaRPr lang="en-NZ" dirty="0"/>
+          </a:p>
+        </p:txBody>
+      </p:sp>
+      <p:sp>
+        <p:nvSpPr>
+          <p:cNvPr id="4" name="Slide Number Placeholder 3"/>
+          <p:cNvSpPr>
+            <a:spLocks noGrp="1"/>
+          </p:cNvSpPr>
+          <p:nvPr>
+            <p:ph type="sldNum" sz="quarter" idx="5"/>
+          </p:nvPr>
+        </p:nvSpPr>
+        <p:spPr/>
+        <p:txBody>
+          <a:bodyPr/>
+          <a:lstStyle/>
+          <a:p>
+            <a:fld id="{A008DDF4-253B-4E36-BE28-46B8E6426B7B}" type="slidenum">
+              <a:rPr lang="en-US" smtClean="0"/>
+              <a:t>10</a:t>
+            </a:fld>
+            <a:endParaRPr lang="en-US"/>
+          </a:p>
+        </p:txBody>
+      </p:sp>
+    </p:spTree>
+    <p:extLst>
+      <p:ext uri="{BB962C8B-B14F-4D97-AF65-F5344CB8AC3E}">
+        <p14:creationId xmlns:p14="http://schemas.microsoft.com/office/powerpoint/2010/main" val="3018798467"/>
       </p:ext>
     </p:extLst>
   </p:cSld>
@@ -3286,6 +3626,610 @@
 </p:sld>
 </file>
 
+<file path=ppt/slides/slide10.xml><?xml version="1.0" encoding="utf-8"?>
+<p:sld xmlns:a="http://schemas.openxmlformats.org/drawingml/2006/main" xmlns:r="http://schemas.openxmlformats.org/officeDocument/2006/relationships" xmlns:p="http://schemas.openxmlformats.org/presentationml/2006/main">
+  <p:cSld>
+    <p:spTree>
+      <p:nvGrpSpPr>
+        <p:cNvPr id="1" name=""/>
+        <p:cNvGrpSpPr/>
+        <p:nvPr/>
+      </p:nvGrpSpPr>
+      <p:grpSpPr>
+        <a:xfrm>
+          <a:off x="0" y="0"/>
+          <a:ext cx="0" cy="0"/>
+          <a:chOff x="0" y="0"/>
+          <a:chExt cx="0" cy="0"/>
+        </a:xfrm>
+      </p:grpSpPr>
+      <p:sp>
+        <p:nvSpPr>
+          <p:cNvPr id="4" name="Title 1">
+            <a:extLst>
+              <a:ext uri="{FF2B5EF4-FFF2-40B4-BE49-F238E27FC236}">
+                <a16:creationId xmlns:a16="http://schemas.microsoft.com/office/drawing/2014/main" id="{B3C7A79F-AD5F-4A40-AB17-D2528E972419}"/>
+              </a:ext>
+            </a:extLst>
+          </p:cNvPr>
+          <p:cNvSpPr txBox="1">
+            <a:spLocks/>
+          </p:cNvSpPr>
+          <p:nvPr/>
+        </p:nvSpPr>
+        <p:spPr>
+          <a:xfrm>
+            <a:off x="135907" y="393003"/>
+            <a:ext cx="6203247" cy="707887"/>
+          </a:xfrm>
+          <a:prstGeom prst="rect">
+            <a:avLst/>
+          </a:prstGeom>
+        </p:spPr>
+        <p:txBody>
+          <a:bodyPr/>
+          <a:lstStyle>
+            <a:lvl1pPr algn="l" defTabSz="914400" rtl="0" eaLnBrk="1" latinLnBrk="0" hangingPunct="1">
+              <a:lnSpc>
+                <a:spcPct val="90000"/>
+              </a:lnSpc>
+              <a:spcBef>
+                <a:spcPct val="0"/>
+              </a:spcBef>
+              <a:buNone/>
+              <a:defRPr sz="4400" kern="1200">
+                <a:solidFill>
+                  <a:schemeClr val="tx1"/>
+                </a:solidFill>
+                <a:latin typeface="Segoe UI Light" panose="020B0502040204020203" pitchFamily="34" charset="0"/>
+                <a:ea typeface="+mj-ea"/>
+                <a:cs typeface="Segoe UI Light" panose="020B0502040204020203" pitchFamily="34" charset="0"/>
+              </a:defRPr>
+            </a:lvl1pPr>
+          </a:lstStyle>
+          <a:p>
+            <a:r>
+              <a:rPr lang="en-US" dirty="0">
+                <a:solidFill>
+                  <a:srgbClr val="7030A0"/>
+                </a:solidFill>
+              </a:rPr>
+              <a:t>For loops</a:t>
+            </a:r>
+          </a:p>
+        </p:txBody>
+      </p:sp>
+      <p:pic>
+        <p:nvPicPr>
+          <p:cNvPr id="5" name="Picture 4" descr="A picture containing drawing&#10;&#10;Description automatically generated">
+            <a:extLst>
+              <a:ext uri="{FF2B5EF4-FFF2-40B4-BE49-F238E27FC236}">
+                <a16:creationId xmlns:a16="http://schemas.microsoft.com/office/drawing/2014/main" id="{1DC23D56-E23D-4805-97DB-DEF341EE45A9}"/>
+              </a:ext>
+            </a:extLst>
+          </p:cNvPr>
+          <p:cNvPicPr>
+            <a:picLocks noChangeAspect="1"/>
+          </p:cNvPicPr>
+          <p:nvPr/>
+        </p:nvPicPr>
+        <p:blipFill>
+          <a:blip r:embed="rId3">
+            <a:extLst>
+              <a:ext uri="{28A0092B-C50C-407E-A947-70E740481C1C}">
+                <a14:useLocalDpi xmlns:a14="http://schemas.microsoft.com/office/drawing/2010/main" val="0"/>
+              </a:ext>
+            </a:extLst>
+          </a:blip>
+          <a:stretch>
+            <a:fillRect/>
+          </a:stretch>
+        </p:blipFill>
+        <p:spPr>
+          <a:xfrm>
+            <a:off x="8975842" y="280766"/>
+            <a:ext cx="3080250" cy="820124"/>
+          </a:xfrm>
+          <a:prstGeom prst="rect">
+            <a:avLst/>
+          </a:prstGeom>
+        </p:spPr>
+      </p:pic>
+      <p:sp>
+        <p:nvSpPr>
+          <p:cNvPr id="7" name="TextBox 6">
+            <a:extLst>
+              <a:ext uri="{FF2B5EF4-FFF2-40B4-BE49-F238E27FC236}">
+                <a16:creationId xmlns:a16="http://schemas.microsoft.com/office/drawing/2014/main" id="{AD98738C-4476-481A-A524-6B82A71B7B50}"/>
+              </a:ext>
+            </a:extLst>
+          </p:cNvPr>
+          <p:cNvSpPr txBox="1"/>
+          <p:nvPr/>
+        </p:nvSpPr>
+        <p:spPr>
+          <a:xfrm>
+            <a:off x="279070" y="1321519"/>
+            <a:ext cx="11378313" cy="707886"/>
+          </a:xfrm>
+          <a:prstGeom prst="rect">
+            <a:avLst/>
+          </a:prstGeom>
+          <a:noFill/>
+        </p:spPr>
+        <p:txBody>
+          <a:bodyPr wrap="square" rtlCol="0">
+            <a:spAutoFit/>
+          </a:bodyPr>
+          <a:lstStyle/>
+          <a:p>
+            <a:endParaRPr lang="en-NZ" sz="4000" dirty="0">
+              <a:solidFill>
+                <a:schemeClr val="tx1">
+                  <a:lumMod val="65000"/>
+                  <a:lumOff val="35000"/>
+                </a:schemeClr>
+              </a:solidFill>
+            </a:endParaRPr>
+          </a:p>
+        </p:txBody>
+      </p:sp>
+      <p:pic>
+        <p:nvPicPr>
+          <p:cNvPr id="3" name="Picture 2" descr="A picture containing clock, meter, room&#10;&#10;Description automatically generated">
+            <a:extLst>
+              <a:ext uri="{FF2B5EF4-FFF2-40B4-BE49-F238E27FC236}">
+                <a16:creationId xmlns:a16="http://schemas.microsoft.com/office/drawing/2014/main" id="{23B5DD67-44CE-4829-8BBF-110839E73249}"/>
+              </a:ext>
+            </a:extLst>
+          </p:cNvPr>
+          <p:cNvPicPr>
+            <a:picLocks noChangeAspect="1"/>
+          </p:cNvPicPr>
+          <p:nvPr/>
+        </p:nvPicPr>
+        <p:blipFill rotWithShape="1">
+          <a:blip r:embed="rId4">
+            <a:extLst>
+              <a:ext uri="{28A0092B-C50C-407E-A947-70E740481C1C}">
+                <a14:useLocalDpi xmlns:a14="http://schemas.microsoft.com/office/drawing/2010/main" val="0"/>
+              </a:ext>
+            </a:extLst>
+          </a:blip>
+          <a:srcRect b="13860"/>
+          <a:stretch/>
+        </p:blipFill>
+        <p:spPr>
+          <a:xfrm>
+            <a:off x="1560027" y="3965819"/>
+            <a:ext cx="8816398" cy="2043353"/>
+          </a:xfrm>
+          <a:prstGeom prst="rect">
+            <a:avLst/>
+          </a:prstGeom>
+        </p:spPr>
+      </p:pic>
+      <p:sp>
+        <p:nvSpPr>
+          <p:cNvPr id="9" name="TextBox 8">
+            <a:extLst>
+              <a:ext uri="{FF2B5EF4-FFF2-40B4-BE49-F238E27FC236}">
+                <a16:creationId xmlns:a16="http://schemas.microsoft.com/office/drawing/2014/main" id="{03081298-B58D-4276-9790-B9367FD30BFF}"/>
+              </a:ext>
+            </a:extLst>
+          </p:cNvPr>
+          <p:cNvSpPr txBox="1"/>
+          <p:nvPr/>
+        </p:nvSpPr>
+        <p:spPr>
+          <a:xfrm>
+            <a:off x="406843" y="1321519"/>
+            <a:ext cx="11378313" cy="2308324"/>
+          </a:xfrm>
+          <a:prstGeom prst="rect">
+            <a:avLst/>
+          </a:prstGeom>
+          <a:noFill/>
+        </p:spPr>
+        <p:txBody>
+          <a:bodyPr wrap="square" rtlCol="0">
+            <a:spAutoFit/>
+          </a:bodyPr>
+          <a:lstStyle/>
+          <a:p>
+            <a:pPr marL="571500" indent="-571500">
+              <a:buFont typeface="Arial" panose="020B0604020202020204" pitchFamily="34" charset="0"/>
+              <a:buChar char="•"/>
+            </a:pPr>
+            <a:r>
+              <a:rPr lang="en-NZ" sz="3600" dirty="0">
+                <a:solidFill>
+                  <a:schemeClr val="tx1">
+                    <a:lumMod val="65000"/>
+                    <a:lumOff val="35000"/>
+                  </a:schemeClr>
+                </a:solidFill>
+              </a:rPr>
+              <a:t>Initialisation</a:t>
+            </a:r>
+          </a:p>
+          <a:p>
+            <a:pPr marL="571500" indent="-571500">
+              <a:buFont typeface="Arial" panose="020B0604020202020204" pitchFamily="34" charset="0"/>
+              <a:buChar char="•"/>
+            </a:pPr>
+            <a:r>
+              <a:rPr lang="en-NZ" sz="3600" dirty="0">
+                <a:solidFill>
+                  <a:schemeClr val="tx1">
+                    <a:lumMod val="65000"/>
+                    <a:lumOff val="35000"/>
+                  </a:schemeClr>
+                </a:solidFill>
+              </a:rPr>
+              <a:t>Condition</a:t>
+            </a:r>
+          </a:p>
+          <a:p>
+            <a:pPr marL="571500" indent="-571500">
+              <a:buFont typeface="Arial" panose="020B0604020202020204" pitchFamily="34" charset="0"/>
+              <a:buChar char="•"/>
+            </a:pPr>
+            <a:r>
+              <a:rPr lang="en-NZ" sz="3600" dirty="0">
+                <a:solidFill>
+                  <a:schemeClr val="tx1">
+                    <a:lumMod val="65000"/>
+                    <a:lumOff val="35000"/>
+                  </a:schemeClr>
+                </a:solidFill>
+              </a:rPr>
+              <a:t>Block of code</a:t>
+            </a:r>
+          </a:p>
+          <a:p>
+            <a:pPr marL="571500" indent="-571500">
+              <a:buFont typeface="Arial" panose="020B0604020202020204" pitchFamily="34" charset="0"/>
+              <a:buChar char="•"/>
+            </a:pPr>
+            <a:r>
+              <a:rPr lang="en-NZ" sz="3600" dirty="0">
+                <a:solidFill>
+                  <a:schemeClr val="tx1">
+                    <a:lumMod val="65000"/>
+                    <a:lumOff val="35000"/>
+                  </a:schemeClr>
+                </a:solidFill>
+              </a:rPr>
+              <a:t>Increment</a:t>
+            </a:r>
+          </a:p>
+        </p:txBody>
+      </p:sp>
+    </p:spTree>
+    <p:extLst>
+      <p:ext uri="{BB962C8B-B14F-4D97-AF65-F5344CB8AC3E}">
+        <p14:creationId xmlns:p14="http://schemas.microsoft.com/office/powerpoint/2010/main" val="2151366315"/>
+      </p:ext>
+    </p:extLst>
+  </p:cSld>
+  <p:clrMapOvr>
+    <a:masterClrMapping/>
+  </p:clrMapOvr>
+</p:sld>
+</file>
+
+<file path=ppt/slides/slide11.xml><?xml version="1.0" encoding="utf-8"?>
+<p:sld xmlns:a="http://schemas.openxmlformats.org/drawingml/2006/main" xmlns:r="http://schemas.openxmlformats.org/officeDocument/2006/relationships" xmlns:p="http://schemas.openxmlformats.org/presentationml/2006/main">
+  <p:cSld>
+    <p:spTree>
+      <p:nvGrpSpPr>
+        <p:cNvPr id="1" name=""/>
+        <p:cNvGrpSpPr/>
+        <p:nvPr/>
+      </p:nvGrpSpPr>
+      <p:grpSpPr>
+        <a:xfrm>
+          <a:off x="0" y="0"/>
+          <a:ext cx="0" cy="0"/>
+          <a:chOff x="0" y="0"/>
+          <a:chExt cx="0" cy="0"/>
+        </a:xfrm>
+      </p:grpSpPr>
+      <p:sp>
+        <p:nvSpPr>
+          <p:cNvPr id="4" name="Title 1">
+            <a:extLst>
+              <a:ext uri="{FF2B5EF4-FFF2-40B4-BE49-F238E27FC236}">
+                <a16:creationId xmlns:a16="http://schemas.microsoft.com/office/drawing/2014/main" id="{B3C7A79F-AD5F-4A40-AB17-D2528E972419}"/>
+              </a:ext>
+            </a:extLst>
+          </p:cNvPr>
+          <p:cNvSpPr txBox="1">
+            <a:spLocks/>
+          </p:cNvSpPr>
+          <p:nvPr/>
+        </p:nvSpPr>
+        <p:spPr>
+          <a:xfrm>
+            <a:off x="135907" y="393003"/>
+            <a:ext cx="6203247" cy="707887"/>
+          </a:xfrm>
+          <a:prstGeom prst="rect">
+            <a:avLst/>
+          </a:prstGeom>
+        </p:spPr>
+        <p:txBody>
+          <a:bodyPr/>
+          <a:lstStyle>
+            <a:lvl1pPr algn="l" defTabSz="914400" rtl="0" eaLnBrk="1" latinLnBrk="0" hangingPunct="1">
+              <a:lnSpc>
+                <a:spcPct val="90000"/>
+              </a:lnSpc>
+              <a:spcBef>
+                <a:spcPct val="0"/>
+              </a:spcBef>
+              <a:buNone/>
+              <a:defRPr sz="4400" kern="1200">
+                <a:solidFill>
+                  <a:schemeClr val="tx1"/>
+                </a:solidFill>
+                <a:latin typeface="Segoe UI Light" panose="020B0502040204020203" pitchFamily="34" charset="0"/>
+                <a:ea typeface="+mj-ea"/>
+                <a:cs typeface="Segoe UI Light" panose="020B0502040204020203" pitchFamily="34" charset="0"/>
+              </a:defRPr>
+            </a:lvl1pPr>
+          </a:lstStyle>
+          <a:p>
+            <a:r>
+              <a:rPr lang="en-US" dirty="0">
+                <a:solidFill>
+                  <a:srgbClr val="7030A0"/>
+                </a:solidFill>
+              </a:rPr>
+              <a:t>Functions</a:t>
+            </a:r>
+          </a:p>
+        </p:txBody>
+      </p:sp>
+      <p:pic>
+        <p:nvPicPr>
+          <p:cNvPr id="5" name="Picture 4" descr="A picture containing drawing&#10;&#10;Description automatically generated">
+            <a:extLst>
+              <a:ext uri="{FF2B5EF4-FFF2-40B4-BE49-F238E27FC236}">
+                <a16:creationId xmlns:a16="http://schemas.microsoft.com/office/drawing/2014/main" id="{1DC23D56-E23D-4805-97DB-DEF341EE45A9}"/>
+              </a:ext>
+            </a:extLst>
+          </p:cNvPr>
+          <p:cNvPicPr>
+            <a:picLocks noChangeAspect="1"/>
+          </p:cNvPicPr>
+          <p:nvPr/>
+        </p:nvPicPr>
+        <p:blipFill>
+          <a:blip r:embed="rId3">
+            <a:extLst>
+              <a:ext uri="{28A0092B-C50C-407E-A947-70E740481C1C}">
+                <a14:useLocalDpi xmlns:a14="http://schemas.microsoft.com/office/drawing/2010/main" val="0"/>
+              </a:ext>
+            </a:extLst>
+          </a:blip>
+          <a:stretch>
+            <a:fillRect/>
+          </a:stretch>
+        </p:blipFill>
+        <p:spPr>
+          <a:xfrm>
+            <a:off x="8975842" y="280766"/>
+            <a:ext cx="3080250" cy="820124"/>
+          </a:xfrm>
+          <a:prstGeom prst="rect">
+            <a:avLst/>
+          </a:prstGeom>
+        </p:spPr>
+      </p:pic>
+      <p:sp>
+        <p:nvSpPr>
+          <p:cNvPr id="7" name="TextBox 6">
+            <a:extLst>
+              <a:ext uri="{FF2B5EF4-FFF2-40B4-BE49-F238E27FC236}">
+                <a16:creationId xmlns:a16="http://schemas.microsoft.com/office/drawing/2014/main" id="{AD98738C-4476-481A-A524-6B82A71B7B50}"/>
+              </a:ext>
+            </a:extLst>
+          </p:cNvPr>
+          <p:cNvSpPr txBox="1"/>
+          <p:nvPr/>
+        </p:nvSpPr>
+        <p:spPr>
+          <a:xfrm>
+            <a:off x="279070" y="1321519"/>
+            <a:ext cx="11378313" cy="707886"/>
+          </a:xfrm>
+          <a:prstGeom prst="rect">
+            <a:avLst/>
+          </a:prstGeom>
+          <a:noFill/>
+        </p:spPr>
+        <p:txBody>
+          <a:bodyPr wrap="square" rtlCol="0">
+            <a:spAutoFit/>
+          </a:bodyPr>
+          <a:lstStyle/>
+          <a:p>
+            <a:endParaRPr lang="en-NZ" sz="4000" dirty="0">
+              <a:solidFill>
+                <a:schemeClr val="tx1">
+                  <a:lumMod val="65000"/>
+                  <a:lumOff val="35000"/>
+                </a:schemeClr>
+              </a:solidFill>
+            </a:endParaRPr>
+          </a:p>
+        </p:txBody>
+      </p:sp>
+      <p:sp>
+        <p:nvSpPr>
+          <p:cNvPr id="8" name="TextBox 7">
+            <a:extLst>
+              <a:ext uri="{FF2B5EF4-FFF2-40B4-BE49-F238E27FC236}">
+                <a16:creationId xmlns:a16="http://schemas.microsoft.com/office/drawing/2014/main" id="{A901992D-96FA-4F01-9123-449CC7A1E1D8}"/>
+              </a:ext>
+            </a:extLst>
+          </p:cNvPr>
+          <p:cNvSpPr txBox="1"/>
+          <p:nvPr/>
+        </p:nvSpPr>
+        <p:spPr>
+          <a:xfrm>
+            <a:off x="279070" y="1226791"/>
+            <a:ext cx="11378313" cy="1754326"/>
+          </a:xfrm>
+          <a:prstGeom prst="rect">
+            <a:avLst/>
+          </a:prstGeom>
+          <a:noFill/>
+        </p:spPr>
+        <p:txBody>
+          <a:bodyPr wrap="square" rtlCol="0">
+            <a:spAutoFit/>
+          </a:bodyPr>
+          <a:lstStyle/>
+          <a:p>
+            <a:pPr marL="571500" indent="-571500">
+              <a:buFont typeface="Arial" panose="020B0604020202020204" pitchFamily="34" charset="0"/>
+              <a:buChar char="•"/>
+            </a:pPr>
+            <a:r>
+              <a:rPr lang="en-NZ" sz="3600" dirty="0">
+                <a:solidFill>
+                  <a:schemeClr val="tx1">
+                    <a:lumMod val="65000"/>
+                    <a:lumOff val="35000"/>
+                  </a:schemeClr>
+                </a:solidFill>
+              </a:rPr>
+              <a:t>Definition</a:t>
+            </a:r>
+          </a:p>
+          <a:p>
+            <a:pPr marL="571500" indent="-571500">
+              <a:buFont typeface="Arial" panose="020B0604020202020204" pitchFamily="34" charset="0"/>
+              <a:buChar char="•"/>
+            </a:pPr>
+            <a:r>
+              <a:rPr lang="en-NZ" sz="3600" dirty="0">
+                <a:solidFill>
+                  <a:schemeClr val="tx1">
+                    <a:lumMod val="65000"/>
+                    <a:lumOff val="35000"/>
+                  </a:schemeClr>
+                </a:solidFill>
+              </a:rPr>
+              <a:t>Code block</a:t>
+            </a:r>
+          </a:p>
+          <a:p>
+            <a:pPr marL="571500" indent="-571500">
+              <a:buFont typeface="Arial" panose="020B0604020202020204" pitchFamily="34" charset="0"/>
+              <a:buChar char="•"/>
+            </a:pPr>
+            <a:r>
+              <a:rPr lang="en-NZ" sz="3600" dirty="0">
+                <a:solidFill>
+                  <a:schemeClr val="tx1">
+                    <a:lumMod val="65000"/>
+                    <a:lumOff val="35000"/>
+                  </a:schemeClr>
+                </a:solidFill>
+              </a:rPr>
+              <a:t>Function calling</a:t>
+            </a:r>
+          </a:p>
+        </p:txBody>
+      </p:sp>
+      <p:pic>
+        <p:nvPicPr>
+          <p:cNvPr id="9" name="Picture 8" descr="A screen shot of a computer&#10;&#10;Description automatically generated">
+            <a:extLst>
+              <a:ext uri="{FF2B5EF4-FFF2-40B4-BE49-F238E27FC236}">
+                <a16:creationId xmlns:a16="http://schemas.microsoft.com/office/drawing/2014/main" id="{9E5CE380-3189-40E1-9ACC-9DE560D9ED76}"/>
+              </a:ext>
+            </a:extLst>
+          </p:cNvPr>
+          <p:cNvPicPr>
+            <a:picLocks noChangeAspect="1"/>
+          </p:cNvPicPr>
+          <p:nvPr/>
+        </p:nvPicPr>
+        <p:blipFill rotWithShape="1">
+          <a:blip r:embed="rId4">
+            <a:extLst>
+              <a:ext uri="{28A0092B-C50C-407E-A947-70E740481C1C}">
+                <a14:useLocalDpi xmlns:a14="http://schemas.microsoft.com/office/drawing/2010/main" val="0"/>
+              </a:ext>
+            </a:extLst>
+          </a:blip>
+          <a:srcRect r="35672"/>
+          <a:stretch/>
+        </p:blipFill>
+        <p:spPr>
+          <a:xfrm>
+            <a:off x="3354858" y="3196875"/>
+            <a:ext cx="3693213" cy="2804047"/>
+          </a:xfrm>
+          <a:prstGeom prst="rect">
+            <a:avLst/>
+          </a:prstGeom>
+        </p:spPr>
+      </p:pic>
+      <p:pic>
+        <p:nvPicPr>
+          <p:cNvPr id="11" name="Picture 10" descr="A close up of a screen&#10;&#10;Description automatically generated">
+            <a:extLst>
+              <a:ext uri="{FF2B5EF4-FFF2-40B4-BE49-F238E27FC236}">
+                <a16:creationId xmlns:a16="http://schemas.microsoft.com/office/drawing/2014/main" id="{0709E52F-8641-43C1-B5BB-5F4E66250D49}"/>
+              </a:ext>
+            </a:extLst>
+          </p:cNvPr>
+          <p:cNvPicPr>
+            <a:picLocks noChangeAspect="1"/>
+          </p:cNvPicPr>
+          <p:nvPr/>
+        </p:nvPicPr>
+        <p:blipFill rotWithShape="1">
+          <a:blip r:embed="rId5">
+            <a:extLst>
+              <a:ext uri="{28A0092B-C50C-407E-A947-70E740481C1C}">
+                <a14:useLocalDpi xmlns:a14="http://schemas.microsoft.com/office/drawing/2010/main" val="0"/>
+              </a:ext>
+            </a:extLst>
+          </a:blip>
+          <a:srcRect r="69746"/>
+          <a:stretch/>
+        </p:blipFill>
+        <p:spPr>
+          <a:xfrm>
+            <a:off x="8041690" y="3193885"/>
+            <a:ext cx="1868304" cy="2807037"/>
+          </a:xfrm>
+          <a:prstGeom prst="rect">
+            <a:avLst/>
+          </a:prstGeom>
+        </p:spPr>
+      </p:pic>
+    </p:spTree>
+    <p:extLst>
+      <p:ext uri="{BB962C8B-B14F-4D97-AF65-F5344CB8AC3E}">
+        <p14:creationId xmlns:p14="http://schemas.microsoft.com/office/powerpoint/2010/main" val="3838931368"/>
+      </p:ext>
+    </p:extLst>
+  </p:cSld>
+  <p:clrMapOvr>
+    <a:masterClrMapping/>
+  </p:clrMapOvr>
+</p:sld>
+</file>
+
 <file path=ppt/slides/slide2.xml><?xml version="1.0" encoding="utf-8"?>
 <p:sld xmlns:a="http://schemas.openxmlformats.org/drawingml/2006/main" xmlns:r="http://schemas.openxmlformats.org/officeDocument/2006/relationships" xmlns:p="http://schemas.openxmlformats.org/presentationml/2006/main">
   <p:cSld>
@@ -4541,7 +5485,7 @@
                   </a:schemeClr>
                 </a:solidFill>
               </a:rPr>
-              <a:t>= (assignment)</a:t>
+              <a:t>=    (assignment)</a:t>
             </a:r>
           </a:p>
           <a:p>
@@ -4558,7 +5502,7 @@
                   </a:schemeClr>
                 </a:solidFill>
               </a:rPr>
-              <a:t>+ (addition or concatenation)</a:t>
+              <a:t>+    (addition or concatenation)</a:t>
             </a:r>
           </a:p>
           <a:p>
@@ -4575,7 +5519,7 @@
                   </a:schemeClr>
                 </a:solidFill>
               </a:rPr>
-              <a:t>- (subtraction)</a:t>
+              <a:t>-     (subtraction)</a:t>
             </a:r>
           </a:p>
           <a:p>
@@ -4592,7 +5536,7 @@
                   </a:schemeClr>
                 </a:solidFill>
               </a:rPr>
-              <a:t>* (multiplication)</a:t>
+              <a:t>*    (multiplication)</a:t>
             </a:r>
           </a:p>
           <a:p>
@@ -4609,7 +5553,7 @@
                   </a:schemeClr>
                 </a:solidFill>
               </a:rPr>
-              <a:t>/ (division)</a:t>
+              <a:t>/    (division)</a:t>
             </a:r>
           </a:p>
           <a:p>
@@ -4626,7 +5570,7 @@
                   </a:schemeClr>
                 </a:solidFill>
               </a:rPr>
-              <a:t>% (modulo)</a:t>
+              <a:t>%   (modulo)</a:t>
             </a:r>
           </a:p>
           <a:p>
@@ -4808,10 +5752,10 @@
       </p:sp>
       <p:sp>
         <p:nvSpPr>
-          <p:cNvPr id="9" name="TextBox 8">
+          <p:cNvPr id="6" name="TextBox 5">
             <a:extLst>
               <a:ext uri="{FF2B5EF4-FFF2-40B4-BE49-F238E27FC236}">
-                <a16:creationId xmlns:a16="http://schemas.microsoft.com/office/drawing/2014/main" id="{3E948F63-71F8-46E0-A5C7-070A21BFFD0A}"/>
+                <a16:creationId xmlns:a16="http://schemas.microsoft.com/office/drawing/2014/main" id="{A83007EE-1D05-4C86-B82A-8FA85442FC55}"/>
               </a:ext>
             </a:extLst>
           </p:cNvPr>
@@ -4821,7 +5765,7 @@
         <p:spPr>
           <a:xfrm>
             <a:off x="412634" y="1535015"/>
-            <a:ext cx="11378313" cy="646331"/>
+            <a:ext cx="11378313" cy="2308324"/>
           </a:xfrm>
           <a:prstGeom prst="rect">
             <a:avLst/>
@@ -4838,7 +5782,224 @@
               <a:buFont typeface="Arial" panose="020B0604020202020204" pitchFamily="34" charset="0"/>
               <a:buChar char="•"/>
             </a:pPr>
-            <a:endParaRPr lang="en-NZ" sz="3600" dirty="0">
+            <a:r>
+              <a:rPr lang="en-NZ" sz="3600" dirty="0">
+                <a:solidFill>
+                  <a:schemeClr val="tx1">
+                    <a:lumMod val="65000"/>
+                    <a:lumOff val="35000"/>
+                  </a:schemeClr>
+                </a:solidFill>
+              </a:rPr>
+              <a:t>Arrays are used to store multiple values in a single variable.</a:t>
+            </a:r>
+          </a:p>
+          <a:p>
+            <a:pPr marL="571500" indent="-571500">
+              <a:buFont typeface="Arial" panose="020B0604020202020204" pitchFamily="34" charset="0"/>
+              <a:buChar char="•"/>
+            </a:pPr>
+            <a:r>
+              <a:rPr lang="en-NZ" sz="3600" dirty="0">
+                <a:solidFill>
+                  <a:schemeClr val="tx1">
+                    <a:lumMod val="65000"/>
+                    <a:lumOff val="35000"/>
+                  </a:schemeClr>
+                </a:solidFill>
+              </a:rPr>
+              <a:t>Each entry in the array is referred to using an index starting from 0.</a:t>
+            </a:r>
+          </a:p>
+        </p:txBody>
+      </p:sp>
+      <p:pic>
+        <p:nvPicPr>
+          <p:cNvPr id="3" name="Picture 2" descr="A close up of a screen&#10;&#10;Description automatically generated">
+            <a:extLst>
+              <a:ext uri="{FF2B5EF4-FFF2-40B4-BE49-F238E27FC236}">
+                <a16:creationId xmlns:a16="http://schemas.microsoft.com/office/drawing/2014/main" id="{7FC3C532-FDA6-4F5B-A209-B757A01B8EEB}"/>
+              </a:ext>
+            </a:extLst>
+          </p:cNvPr>
+          <p:cNvPicPr>
+            <a:picLocks noChangeAspect="1"/>
+          </p:cNvPicPr>
+          <p:nvPr/>
+        </p:nvPicPr>
+        <p:blipFill>
+          <a:blip r:embed="rId4">
+            <a:extLst>
+              <a:ext uri="{28A0092B-C50C-407E-A947-70E740481C1C}">
+                <a14:useLocalDpi xmlns:a14="http://schemas.microsoft.com/office/drawing/2010/main" val="0"/>
+              </a:ext>
+            </a:extLst>
+          </a:blip>
+          <a:stretch>
+            <a:fillRect/>
+          </a:stretch>
+        </p:blipFill>
+        <p:spPr>
+          <a:xfrm>
+            <a:off x="2021115" y="4056835"/>
+            <a:ext cx="7239763" cy="1274482"/>
+          </a:xfrm>
+          <a:prstGeom prst="rect">
+            <a:avLst/>
+          </a:prstGeom>
+        </p:spPr>
+      </p:pic>
+    </p:spTree>
+    <p:extLst>
+      <p:ext uri="{BB962C8B-B14F-4D97-AF65-F5344CB8AC3E}">
+        <p14:creationId xmlns:p14="http://schemas.microsoft.com/office/powerpoint/2010/main" val="628384511"/>
+      </p:ext>
+    </p:extLst>
+  </p:cSld>
+  <p:clrMapOvr>
+    <a:masterClrMapping/>
+  </p:clrMapOvr>
+</p:sld>
+</file>
+
+<file path=ppt/slides/slide8.xml><?xml version="1.0" encoding="utf-8"?>
+<p:sld xmlns:a="http://schemas.openxmlformats.org/drawingml/2006/main" xmlns:r="http://schemas.openxmlformats.org/officeDocument/2006/relationships" xmlns:p="http://schemas.openxmlformats.org/presentationml/2006/main">
+  <p:cSld>
+    <p:spTree>
+      <p:nvGrpSpPr>
+        <p:cNvPr id="1" name=""/>
+        <p:cNvGrpSpPr/>
+        <p:nvPr/>
+      </p:nvGrpSpPr>
+      <p:grpSpPr>
+        <a:xfrm>
+          <a:off x="0" y="0"/>
+          <a:ext cx="0" cy="0"/>
+          <a:chOff x="0" y="0"/>
+          <a:chExt cx="0" cy="0"/>
+        </a:xfrm>
+      </p:grpSpPr>
+      <p:sp>
+        <p:nvSpPr>
+          <p:cNvPr id="4" name="Title 1">
+            <a:extLst>
+              <a:ext uri="{FF2B5EF4-FFF2-40B4-BE49-F238E27FC236}">
+                <a16:creationId xmlns:a16="http://schemas.microsoft.com/office/drawing/2014/main" id="{B3C7A79F-AD5F-4A40-AB17-D2528E972419}"/>
+              </a:ext>
+            </a:extLst>
+          </p:cNvPr>
+          <p:cNvSpPr txBox="1">
+            <a:spLocks/>
+          </p:cNvSpPr>
+          <p:nvPr/>
+        </p:nvSpPr>
+        <p:spPr>
+          <a:xfrm>
+            <a:off x="135907" y="393003"/>
+            <a:ext cx="6203247" cy="707887"/>
+          </a:xfrm>
+          <a:prstGeom prst="rect">
+            <a:avLst/>
+          </a:prstGeom>
+        </p:spPr>
+        <p:txBody>
+          <a:bodyPr/>
+          <a:lstStyle>
+            <a:lvl1pPr algn="l" defTabSz="914400" rtl="0" eaLnBrk="1" latinLnBrk="0" hangingPunct="1">
+              <a:lnSpc>
+                <a:spcPct val="90000"/>
+              </a:lnSpc>
+              <a:spcBef>
+                <a:spcPct val="0"/>
+              </a:spcBef>
+              <a:buNone/>
+              <a:defRPr sz="4400" kern="1200">
+                <a:solidFill>
+                  <a:schemeClr val="tx1"/>
+                </a:solidFill>
+                <a:latin typeface="Segoe UI Light" panose="020B0502040204020203" pitchFamily="34" charset="0"/>
+                <a:ea typeface="+mj-ea"/>
+                <a:cs typeface="Segoe UI Light" panose="020B0502040204020203" pitchFamily="34" charset="0"/>
+              </a:defRPr>
+            </a:lvl1pPr>
+          </a:lstStyle>
+          <a:p>
+            <a:r>
+              <a:rPr lang="en-US" dirty="0">
+                <a:solidFill>
+                  <a:srgbClr val="7030A0"/>
+                </a:solidFill>
+              </a:rPr>
+              <a:t>Loops</a:t>
+            </a:r>
+          </a:p>
+        </p:txBody>
+      </p:sp>
+      <p:pic>
+        <p:nvPicPr>
+          <p:cNvPr id="5" name="Picture 4" descr="A picture containing drawing&#10;&#10;Description automatically generated">
+            <a:extLst>
+              <a:ext uri="{FF2B5EF4-FFF2-40B4-BE49-F238E27FC236}">
+                <a16:creationId xmlns:a16="http://schemas.microsoft.com/office/drawing/2014/main" id="{1DC23D56-E23D-4805-97DB-DEF341EE45A9}"/>
+              </a:ext>
+            </a:extLst>
+          </p:cNvPr>
+          <p:cNvPicPr>
+            <a:picLocks noChangeAspect="1"/>
+          </p:cNvPicPr>
+          <p:nvPr/>
+        </p:nvPicPr>
+        <p:blipFill>
+          <a:blip r:embed="rId3">
+            <a:extLst>
+              <a:ext uri="{28A0092B-C50C-407E-A947-70E740481C1C}">
+                <a14:useLocalDpi xmlns:a14="http://schemas.microsoft.com/office/drawing/2010/main" val="0"/>
+              </a:ext>
+            </a:extLst>
+          </a:blip>
+          <a:stretch>
+            <a:fillRect/>
+          </a:stretch>
+        </p:blipFill>
+        <p:spPr>
+          <a:xfrm>
+            <a:off x="8975842" y="280766"/>
+            <a:ext cx="3080250" cy="820124"/>
+          </a:xfrm>
+          <a:prstGeom prst="rect">
+            <a:avLst/>
+          </a:prstGeom>
+        </p:spPr>
+      </p:pic>
+      <p:sp>
+        <p:nvSpPr>
+          <p:cNvPr id="7" name="TextBox 6">
+            <a:extLst>
+              <a:ext uri="{FF2B5EF4-FFF2-40B4-BE49-F238E27FC236}">
+                <a16:creationId xmlns:a16="http://schemas.microsoft.com/office/drawing/2014/main" id="{AD98738C-4476-481A-A524-6B82A71B7B50}"/>
+              </a:ext>
+            </a:extLst>
+          </p:cNvPr>
+          <p:cNvSpPr txBox="1"/>
+          <p:nvPr/>
+        </p:nvSpPr>
+        <p:spPr>
+          <a:xfrm>
+            <a:off x="279070" y="1321519"/>
+            <a:ext cx="11378313" cy="707886"/>
+          </a:xfrm>
+          <a:prstGeom prst="rect">
+            <a:avLst/>
+          </a:prstGeom>
+          <a:noFill/>
+        </p:spPr>
+        <p:txBody>
+          <a:bodyPr wrap="square" rtlCol="0">
+            <a:spAutoFit/>
+          </a:bodyPr>
+          <a:lstStyle/>
+          <a:p>
+            <a:endParaRPr lang="en-NZ" sz="4000" dirty="0">
               <a:solidFill>
                 <a:schemeClr val="tx1">
                   <a:lumMod val="65000"/>
@@ -4849,10 +6010,344 @@
           </a:p>
         </p:txBody>
       </p:sp>
+      <p:sp>
+        <p:nvSpPr>
+          <p:cNvPr id="6" name="TextBox 5">
+            <a:extLst>
+              <a:ext uri="{FF2B5EF4-FFF2-40B4-BE49-F238E27FC236}">
+                <a16:creationId xmlns:a16="http://schemas.microsoft.com/office/drawing/2014/main" id="{A83007EE-1D05-4C86-B82A-8FA85442FC55}"/>
+              </a:ext>
+            </a:extLst>
+          </p:cNvPr>
+          <p:cNvSpPr txBox="1"/>
+          <p:nvPr/>
+        </p:nvSpPr>
+        <p:spPr>
+          <a:xfrm>
+            <a:off x="412634" y="1535015"/>
+            <a:ext cx="11378313" cy="2308324"/>
+          </a:xfrm>
+          <a:prstGeom prst="rect">
+            <a:avLst/>
+          </a:prstGeom>
+          <a:noFill/>
+        </p:spPr>
+        <p:txBody>
+          <a:bodyPr wrap="square" rtlCol="0">
+            <a:spAutoFit/>
+          </a:bodyPr>
+          <a:lstStyle/>
+          <a:p>
+            <a:pPr marL="571500" indent="-571500">
+              <a:buFont typeface="Arial" panose="020B0604020202020204" pitchFamily="34" charset="0"/>
+              <a:buChar char="•"/>
+            </a:pPr>
+            <a:r>
+              <a:rPr lang="en-NZ" sz="3600" dirty="0">
+                <a:solidFill>
+                  <a:schemeClr val="tx1">
+                    <a:lumMod val="65000"/>
+                    <a:lumOff val="35000"/>
+                  </a:schemeClr>
+                </a:solidFill>
+              </a:rPr>
+              <a:t>Loops are used to implement repetition into a block of code.</a:t>
+            </a:r>
+          </a:p>
+          <a:p>
+            <a:pPr marL="571500" indent="-571500">
+              <a:buFont typeface="Arial" panose="020B0604020202020204" pitchFamily="34" charset="0"/>
+              <a:buChar char="•"/>
+            </a:pPr>
+            <a:r>
+              <a:rPr lang="en-NZ" sz="3600" dirty="0">
+                <a:solidFill>
+                  <a:schemeClr val="tx1">
+                    <a:lumMod val="65000"/>
+                    <a:lumOff val="35000"/>
+                  </a:schemeClr>
+                </a:solidFill>
+              </a:rPr>
+              <a:t>While loops</a:t>
+            </a:r>
+          </a:p>
+          <a:p>
+            <a:pPr marL="571500" indent="-571500">
+              <a:buFont typeface="Arial" panose="020B0604020202020204" pitchFamily="34" charset="0"/>
+              <a:buChar char="•"/>
+            </a:pPr>
+            <a:r>
+              <a:rPr lang="en-NZ" sz="3600" dirty="0">
+                <a:solidFill>
+                  <a:schemeClr val="tx1">
+                    <a:lumMod val="65000"/>
+                    <a:lumOff val="35000"/>
+                  </a:schemeClr>
+                </a:solidFill>
+              </a:rPr>
+              <a:t>For loops</a:t>
+            </a:r>
+          </a:p>
+        </p:txBody>
+      </p:sp>
     </p:spTree>
     <p:extLst>
       <p:ext uri="{BB962C8B-B14F-4D97-AF65-F5344CB8AC3E}">
-        <p14:creationId xmlns:p14="http://schemas.microsoft.com/office/powerpoint/2010/main" val="628384511"/>
+        <p14:creationId xmlns:p14="http://schemas.microsoft.com/office/powerpoint/2010/main" val="3023921313"/>
+      </p:ext>
+    </p:extLst>
+  </p:cSld>
+  <p:clrMapOvr>
+    <a:masterClrMapping/>
+  </p:clrMapOvr>
+</p:sld>
+</file>
+
+<file path=ppt/slides/slide9.xml><?xml version="1.0" encoding="utf-8"?>
+<p:sld xmlns:a="http://schemas.openxmlformats.org/drawingml/2006/main" xmlns:r="http://schemas.openxmlformats.org/officeDocument/2006/relationships" xmlns:p="http://schemas.openxmlformats.org/presentationml/2006/main">
+  <p:cSld>
+    <p:spTree>
+      <p:nvGrpSpPr>
+        <p:cNvPr id="1" name=""/>
+        <p:cNvGrpSpPr/>
+        <p:nvPr/>
+      </p:nvGrpSpPr>
+      <p:grpSpPr>
+        <a:xfrm>
+          <a:off x="0" y="0"/>
+          <a:ext cx="0" cy="0"/>
+          <a:chOff x="0" y="0"/>
+          <a:chExt cx="0" cy="0"/>
+        </a:xfrm>
+      </p:grpSpPr>
+      <p:sp>
+        <p:nvSpPr>
+          <p:cNvPr id="4" name="Title 1">
+            <a:extLst>
+              <a:ext uri="{FF2B5EF4-FFF2-40B4-BE49-F238E27FC236}">
+                <a16:creationId xmlns:a16="http://schemas.microsoft.com/office/drawing/2014/main" id="{B3C7A79F-AD5F-4A40-AB17-D2528E972419}"/>
+              </a:ext>
+            </a:extLst>
+          </p:cNvPr>
+          <p:cNvSpPr txBox="1">
+            <a:spLocks/>
+          </p:cNvSpPr>
+          <p:nvPr/>
+        </p:nvSpPr>
+        <p:spPr>
+          <a:xfrm>
+            <a:off x="135907" y="393003"/>
+            <a:ext cx="6203247" cy="707887"/>
+          </a:xfrm>
+          <a:prstGeom prst="rect">
+            <a:avLst/>
+          </a:prstGeom>
+        </p:spPr>
+        <p:txBody>
+          <a:bodyPr/>
+          <a:lstStyle>
+            <a:lvl1pPr algn="l" defTabSz="914400" rtl="0" eaLnBrk="1" latinLnBrk="0" hangingPunct="1">
+              <a:lnSpc>
+                <a:spcPct val="90000"/>
+              </a:lnSpc>
+              <a:spcBef>
+                <a:spcPct val="0"/>
+              </a:spcBef>
+              <a:buNone/>
+              <a:defRPr sz="4400" kern="1200">
+                <a:solidFill>
+                  <a:schemeClr val="tx1"/>
+                </a:solidFill>
+                <a:latin typeface="Segoe UI Light" panose="020B0502040204020203" pitchFamily="34" charset="0"/>
+                <a:ea typeface="+mj-ea"/>
+                <a:cs typeface="Segoe UI Light" panose="020B0502040204020203" pitchFamily="34" charset="0"/>
+              </a:defRPr>
+            </a:lvl1pPr>
+          </a:lstStyle>
+          <a:p>
+            <a:r>
+              <a:rPr lang="en-US" dirty="0">
+                <a:solidFill>
+                  <a:srgbClr val="7030A0"/>
+                </a:solidFill>
+              </a:rPr>
+              <a:t>While loops</a:t>
+            </a:r>
+          </a:p>
+        </p:txBody>
+      </p:sp>
+      <p:pic>
+        <p:nvPicPr>
+          <p:cNvPr id="5" name="Picture 4" descr="A picture containing drawing&#10;&#10;Description automatically generated">
+            <a:extLst>
+              <a:ext uri="{FF2B5EF4-FFF2-40B4-BE49-F238E27FC236}">
+                <a16:creationId xmlns:a16="http://schemas.microsoft.com/office/drawing/2014/main" id="{1DC23D56-E23D-4805-97DB-DEF341EE45A9}"/>
+              </a:ext>
+            </a:extLst>
+          </p:cNvPr>
+          <p:cNvPicPr>
+            <a:picLocks noChangeAspect="1"/>
+          </p:cNvPicPr>
+          <p:nvPr/>
+        </p:nvPicPr>
+        <p:blipFill>
+          <a:blip r:embed="rId3">
+            <a:extLst>
+              <a:ext uri="{28A0092B-C50C-407E-A947-70E740481C1C}">
+                <a14:useLocalDpi xmlns:a14="http://schemas.microsoft.com/office/drawing/2010/main" val="0"/>
+              </a:ext>
+            </a:extLst>
+          </a:blip>
+          <a:stretch>
+            <a:fillRect/>
+          </a:stretch>
+        </p:blipFill>
+        <p:spPr>
+          <a:xfrm>
+            <a:off x="8975842" y="280766"/>
+            <a:ext cx="3080250" cy="820124"/>
+          </a:xfrm>
+          <a:prstGeom prst="rect">
+            <a:avLst/>
+          </a:prstGeom>
+        </p:spPr>
+      </p:pic>
+      <p:sp>
+        <p:nvSpPr>
+          <p:cNvPr id="6" name="TextBox 5">
+            <a:extLst>
+              <a:ext uri="{FF2B5EF4-FFF2-40B4-BE49-F238E27FC236}">
+                <a16:creationId xmlns:a16="http://schemas.microsoft.com/office/drawing/2014/main" id="{A83007EE-1D05-4C86-B82A-8FA85442FC55}"/>
+              </a:ext>
+            </a:extLst>
+          </p:cNvPr>
+          <p:cNvSpPr txBox="1"/>
+          <p:nvPr/>
+        </p:nvSpPr>
+        <p:spPr>
+          <a:xfrm>
+            <a:off x="406842" y="1424700"/>
+            <a:ext cx="11378313" cy="2308324"/>
+          </a:xfrm>
+          <a:prstGeom prst="rect">
+            <a:avLst/>
+          </a:prstGeom>
+          <a:noFill/>
+        </p:spPr>
+        <p:txBody>
+          <a:bodyPr wrap="square" rtlCol="0">
+            <a:spAutoFit/>
+          </a:bodyPr>
+          <a:lstStyle/>
+          <a:p>
+            <a:pPr marL="571500" indent="-571500">
+              <a:buFont typeface="Arial" panose="020B0604020202020204" pitchFamily="34" charset="0"/>
+              <a:buChar char="•"/>
+            </a:pPr>
+            <a:r>
+              <a:rPr lang="en-NZ" sz="3600" dirty="0">
+                <a:solidFill>
+                  <a:schemeClr val="tx1">
+                    <a:lumMod val="65000"/>
+                    <a:lumOff val="35000"/>
+                  </a:schemeClr>
+                </a:solidFill>
+              </a:rPr>
+              <a:t>Initialisation</a:t>
+            </a:r>
+          </a:p>
+          <a:p>
+            <a:pPr marL="571500" indent="-571500">
+              <a:buFont typeface="Arial" panose="020B0604020202020204" pitchFamily="34" charset="0"/>
+              <a:buChar char="•"/>
+            </a:pPr>
+            <a:r>
+              <a:rPr lang="en-NZ" sz="3600" dirty="0">
+                <a:solidFill>
+                  <a:schemeClr val="tx1">
+                    <a:lumMod val="65000"/>
+                    <a:lumOff val="35000"/>
+                  </a:schemeClr>
+                </a:solidFill>
+              </a:rPr>
+              <a:t>Condition</a:t>
+            </a:r>
+          </a:p>
+          <a:p>
+            <a:pPr marL="571500" indent="-571500">
+              <a:buFont typeface="Arial" panose="020B0604020202020204" pitchFamily="34" charset="0"/>
+              <a:buChar char="•"/>
+            </a:pPr>
+            <a:r>
+              <a:rPr lang="en-NZ" sz="3600" dirty="0">
+                <a:solidFill>
+                  <a:schemeClr val="tx1">
+                    <a:lumMod val="65000"/>
+                    <a:lumOff val="35000"/>
+                  </a:schemeClr>
+                </a:solidFill>
+              </a:rPr>
+              <a:t>Block of code</a:t>
+            </a:r>
+          </a:p>
+          <a:p>
+            <a:pPr marL="571500" indent="-571500">
+              <a:buFont typeface="Arial" panose="020B0604020202020204" pitchFamily="34" charset="0"/>
+              <a:buChar char="•"/>
+            </a:pPr>
+            <a:r>
+              <a:rPr lang="en-NZ" sz="3600" dirty="0">
+                <a:solidFill>
+                  <a:schemeClr val="tx1">
+                    <a:lumMod val="65000"/>
+                    <a:lumOff val="35000"/>
+                  </a:schemeClr>
+                </a:solidFill>
+              </a:rPr>
+              <a:t>Increment</a:t>
+            </a:r>
+          </a:p>
+        </p:txBody>
+      </p:sp>
+      <p:pic>
+        <p:nvPicPr>
+          <p:cNvPr id="8" name="Picture 7" descr="A close up of a screen&#10;&#10;Description automatically generated">
+            <a:extLst>
+              <a:ext uri="{FF2B5EF4-FFF2-40B4-BE49-F238E27FC236}">
+                <a16:creationId xmlns:a16="http://schemas.microsoft.com/office/drawing/2014/main" id="{4DA5586C-AAF5-4578-83C5-7A9531062920}"/>
+              </a:ext>
+            </a:extLst>
+          </p:cNvPr>
+          <p:cNvPicPr>
+            <a:picLocks noChangeAspect="1"/>
+          </p:cNvPicPr>
+          <p:nvPr/>
+        </p:nvPicPr>
+        <p:blipFill rotWithShape="1">
+          <a:blip r:embed="rId4">
+            <a:extLst>
+              <a:ext uri="{28A0092B-C50C-407E-A947-70E740481C1C}">
+                <a14:useLocalDpi xmlns:a14="http://schemas.microsoft.com/office/drawing/2010/main" val="0"/>
+              </a:ext>
+            </a:extLst>
+          </a:blip>
+          <a:srcRect b="12139"/>
+          <a:stretch/>
+        </p:blipFill>
+        <p:spPr>
+          <a:xfrm>
+            <a:off x="4098398" y="4056835"/>
+            <a:ext cx="3995203" cy="2001685"/>
+          </a:xfrm>
+          <a:prstGeom prst="rect">
+            <a:avLst/>
+          </a:prstGeom>
+        </p:spPr>
+      </p:pic>
+    </p:spTree>
+    <p:extLst>
+      <p:ext uri="{BB962C8B-B14F-4D97-AF65-F5344CB8AC3E}">
+        <p14:creationId xmlns:p14="http://schemas.microsoft.com/office/powerpoint/2010/main" val="1600135054"/>
       </p:ext>
     </p:extLst>
   </p:cSld>
@@ -5453,6 +6948,21 @@
 </file>
 
 <file path=customXml/item1.xml><?xml version="1.0" encoding="utf-8"?>
+<p:properties xmlns:p="http://schemas.microsoft.com/office/2006/metadata/properties" xmlns:xsi="http://www.w3.org/2001/XMLSchema-instance" xmlns:pc="http://schemas.microsoft.com/office/infopath/2007/PartnerControls">
+  <documentManagement/>
+</p:properties>
+</file>
+
+<file path=customXml/item2.xml><?xml version="1.0" encoding="utf-8"?>
+<?mso-contentType ?>
+<FormTemplates xmlns="http://schemas.microsoft.com/sharepoint/v3/contenttype/forms">
+  <Display>DocumentLibraryForm</Display>
+  <Edit>DocumentLibraryForm</Edit>
+  <New>DocumentLibraryForm</New>
+</FormTemplates>
+</file>
+
+<file path=customXml/item3.xml><?xml version="1.0" encoding="utf-8"?>
 <ct:contentTypeSchema xmlns:ct="http://schemas.microsoft.com/office/2006/metadata/contentType" xmlns:ma="http://schemas.microsoft.com/office/2006/metadata/properties/metaAttributes" ct:_="" ma:_="" ma:contentTypeName="Document" ma:contentTypeID="0x010100E93C242A5CEB2D47B470CCC9086D4F41" ma:contentTypeVersion="8" ma:contentTypeDescription="Create a new document." ma:contentTypeScope="" ma:versionID="9f247184716c8b822e3549056a62d5ca">
   <xsd:schema xmlns:xsd="http://www.w3.org/2001/XMLSchema" xmlns:xs="http://www.w3.org/2001/XMLSchema" xmlns:p="http://schemas.microsoft.com/office/2006/metadata/properties" xmlns:ns2="b7ac0d6e-52d3-4232-9ee4-5c4d9894bf3c" targetNamespace="http://schemas.microsoft.com/office/2006/metadata/properties" ma:root="true" ma:fieldsID="067541c65ced21005bd2e6630d9f2f27" ns2:_="">
     <xsd:import namespace="b7ac0d6e-52d3-4232-9ee4-5c4d9894bf3c"/>
@@ -5624,22 +7134,31 @@
 </ct:contentTypeSchema>
 </file>
 
-<file path=customXml/item2.xml><?xml version="1.0" encoding="utf-8"?>
-<?mso-contentType ?>
-<FormTemplates xmlns="http://schemas.microsoft.com/sharepoint/v3/contenttype/forms">
-  <Display>DocumentLibraryForm</Display>
-  <Edit>DocumentLibraryForm</Edit>
-  <New>DocumentLibraryForm</New>
-</FormTemplates>
+<file path=customXml/itemProps1.xml><?xml version="1.0" encoding="utf-8"?>
+<ds:datastoreItem xmlns:ds="http://schemas.openxmlformats.org/officeDocument/2006/customXml" ds:itemID="{68BBE704-B474-4F72-9E56-BC8B9AC8B9DF}">
+  <ds:schemaRefs>
+    <ds:schemaRef ds:uri="http://purl.org/dc/terms/"/>
+    <ds:schemaRef ds:uri="http://schemas.openxmlformats.org/package/2006/metadata/core-properties"/>
+    <ds:schemaRef ds:uri="http://schemas.microsoft.com/office/2006/documentManagement/types"/>
+    <ds:schemaRef ds:uri="http://purl.org/dc/dcmitype/"/>
+    <ds:schemaRef ds:uri="http://schemas.microsoft.com/office/infopath/2007/PartnerControls"/>
+    <ds:schemaRef ds:uri="b7ac0d6e-52d3-4232-9ee4-5c4d9894bf3c"/>
+    <ds:schemaRef ds:uri="http://purl.org/dc/elements/1.1/"/>
+    <ds:schemaRef ds:uri="http://schemas.microsoft.com/office/2006/metadata/properties"/>
+    <ds:schemaRef ds:uri="http://www.w3.org/XML/1998/namespace"/>
+  </ds:schemaRefs>
+</ds:datastoreItem>
 </file>
 
-<file path=customXml/item3.xml><?xml version="1.0" encoding="utf-8"?>
-<p:properties xmlns:p="http://schemas.microsoft.com/office/2006/metadata/properties" xmlns:xsi="http://www.w3.org/2001/XMLSchema-instance" xmlns:pc="http://schemas.microsoft.com/office/infopath/2007/PartnerControls">
-  <documentManagement/>
-</p:properties>
+<file path=customXml/itemProps2.xml><?xml version="1.0" encoding="utf-8"?>
+<ds:datastoreItem xmlns:ds="http://schemas.openxmlformats.org/officeDocument/2006/customXml" ds:itemID="{0FD5B65A-65A2-4216-AFFD-8C37DA453243}">
+  <ds:schemaRefs>
+    <ds:schemaRef ds:uri="http://schemas.microsoft.com/sharepoint/v3/contenttype/forms"/>
+  </ds:schemaRefs>
+</ds:datastoreItem>
 </file>
 
-<file path=customXml/itemProps1.xml><?xml version="1.0" encoding="utf-8"?>
+<file path=customXml/itemProps3.xml><?xml version="1.0" encoding="utf-8"?>
 <ds:datastoreItem xmlns:ds="http://schemas.openxmlformats.org/officeDocument/2006/customXml" ds:itemID="{9B01F9E2-828F-4555-99E5-FC208D4750F5}">
   <ds:schemaRefs>
     <ds:schemaRef ds:uri="http://schemas.microsoft.com/office/2006/metadata/contentType"/>
@@ -5655,28 +7174,4 @@
     <ds:schemaRef ds:uri="http://schemas.microsoft.com/internal/obd"/>
   </ds:schemaRefs>
 </ds:datastoreItem>
-</file>
-
-<file path=customXml/itemProps2.xml><?xml version="1.0" encoding="utf-8"?>
-<ds:datastoreItem xmlns:ds="http://schemas.openxmlformats.org/officeDocument/2006/customXml" ds:itemID="{0FD5B65A-65A2-4216-AFFD-8C37DA453243}">
-  <ds:schemaRefs>
-    <ds:schemaRef ds:uri="http://schemas.microsoft.com/sharepoint/v3/contenttype/forms"/>
-  </ds:schemaRefs>
-</ds:datastoreItem>
-</file>
-
-<file path=customXml/itemProps3.xml><?xml version="1.0" encoding="utf-8"?>
-<ds:datastoreItem xmlns:ds="http://schemas.openxmlformats.org/officeDocument/2006/customXml" ds:itemID="{68BBE704-B474-4F72-9E56-BC8B9AC8B9DF}">
-  <ds:schemaRefs>
-    <ds:schemaRef ds:uri="http://purl.org/dc/terms/"/>
-    <ds:schemaRef ds:uri="http://schemas.openxmlformats.org/package/2006/metadata/core-properties"/>
-    <ds:schemaRef ds:uri="http://schemas.microsoft.com/office/2006/documentManagement/types"/>
-    <ds:schemaRef ds:uri="http://purl.org/dc/dcmitype/"/>
-    <ds:schemaRef ds:uri="http://schemas.microsoft.com/office/infopath/2007/PartnerControls"/>
-    <ds:schemaRef ds:uri="b7ac0d6e-52d3-4232-9ee4-5c4d9894bf3c"/>
-    <ds:schemaRef ds:uri="http://purl.org/dc/elements/1.1/"/>
-    <ds:schemaRef ds:uri="http://schemas.microsoft.com/office/2006/metadata/properties"/>
-    <ds:schemaRef ds:uri="http://www.w3.org/XML/1998/namespace"/>
-  </ds:schemaRefs>
-</ds:datastoreItem>
 </file>
</xml_diff>